<commit_message>
one more wk 4 powerpoint update
</commit_message>
<xml_diff>
--- a/Week04/Lecture.pptx
+++ b/Week04/Lecture.pptx
@@ -211,7 +211,7 @@
           <a:p>
             <a:fld id="{60C6A8C3-8392-4BC1-B99F-0D6991348B0F}" type="datetimeFigureOut">
               <a:rPr lang="en-US" smtClean="0"/>
-              <a:t>2/27/2019</a:t>
+              <a:t>3/2/2020</a:t>
             </a:fld>
             <a:endParaRPr lang="en-US"/>
           </a:p>
@@ -1558,7 +1558,7 @@
           <a:p>
             <a:fld id="{61FD5E12-641C-4696-BA65-B86205845F69}" type="datetimeFigureOut">
               <a:rPr lang="en-US" smtClean="0"/>
-              <a:t>2/27/2019</a:t>
+              <a:t>3/2/2020</a:t>
             </a:fld>
             <a:endParaRPr lang="en-US"/>
           </a:p>
@@ -1728,7 +1728,7 @@
           <a:p>
             <a:fld id="{61FD5E12-641C-4696-BA65-B86205845F69}" type="datetimeFigureOut">
               <a:rPr lang="en-US" smtClean="0"/>
-              <a:t>2/27/2019</a:t>
+              <a:t>3/2/2020</a:t>
             </a:fld>
             <a:endParaRPr lang="en-US"/>
           </a:p>
@@ -1908,7 +1908,7 @@
           <a:p>
             <a:fld id="{61FD5E12-641C-4696-BA65-B86205845F69}" type="datetimeFigureOut">
               <a:rPr lang="en-US" smtClean="0"/>
-              <a:t>2/27/2019</a:t>
+              <a:t>3/2/2020</a:t>
             </a:fld>
             <a:endParaRPr lang="en-US"/>
           </a:p>
@@ -2893,7 +2893,7 @@
           <a:p>
             <a:fld id="{61FD5E12-641C-4696-BA65-B86205845F69}" type="datetimeFigureOut">
               <a:rPr lang="en-US" smtClean="0"/>
-              <a:t>2/27/2019</a:t>
+              <a:t>3/2/2020</a:t>
             </a:fld>
             <a:endParaRPr lang="en-US"/>
           </a:p>
@@ -3139,7 +3139,7 @@
           <a:p>
             <a:fld id="{61FD5E12-641C-4696-BA65-B86205845F69}" type="datetimeFigureOut">
               <a:rPr lang="en-US" smtClean="0"/>
-              <a:t>2/27/2019</a:t>
+              <a:t>3/2/2020</a:t>
             </a:fld>
             <a:endParaRPr lang="en-US"/>
           </a:p>
@@ -3371,7 +3371,7 @@
           <a:p>
             <a:fld id="{61FD5E12-641C-4696-BA65-B86205845F69}" type="datetimeFigureOut">
               <a:rPr lang="en-US" smtClean="0"/>
-              <a:t>2/27/2019</a:t>
+              <a:t>3/2/2020</a:t>
             </a:fld>
             <a:endParaRPr lang="en-US"/>
           </a:p>
@@ -3738,7 +3738,7 @@
           <a:p>
             <a:fld id="{61FD5E12-641C-4696-BA65-B86205845F69}" type="datetimeFigureOut">
               <a:rPr lang="en-US" smtClean="0"/>
-              <a:t>2/27/2019</a:t>
+              <a:t>3/2/2020</a:t>
             </a:fld>
             <a:endParaRPr lang="en-US"/>
           </a:p>
@@ -3856,7 +3856,7 @@
           <a:p>
             <a:fld id="{61FD5E12-641C-4696-BA65-B86205845F69}" type="datetimeFigureOut">
               <a:rPr lang="en-US" smtClean="0"/>
-              <a:t>2/27/2019</a:t>
+              <a:t>3/2/2020</a:t>
             </a:fld>
             <a:endParaRPr lang="en-US"/>
           </a:p>
@@ -3951,7 +3951,7 @@
           <a:p>
             <a:fld id="{61FD5E12-641C-4696-BA65-B86205845F69}" type="datetimeFigureOut">
               <a:rPr lang="en-US" smtClean="0"/>
-              <a:t>2/27/2019</a:t>
+              <a:t>3/2/2020</a:t>
             </a:fld>
             <a:endParaRPr lang="en-US"/>
           </a:p>
@@ -4228,7 +4228,7 @@
           <a:p>
             <a:fld id="{61FD5E12-641C-4696-BA65-B86205845F69}" type="datetimeFigureOut">
               <a:rPr lang="en-US" smtClean="0"/>
-              <a:t>2/27/2019</a:t>
+              <a:t>3/2/2020</a:t>
             </a:fld>
             <a:endParaRPr lang="en-US"/>
           </a:p>
@@ -4485,7 +4485,7 @@
           <a:p>
             <a:fld id="{61FD5E12-641C-4696-BA65-B86205845F69}" type="datetimeFigureOut">
               <a:rPr lang="en-US" smtClean="0"/>
-              <a:t>2/27/2019</a:t>
+              <a:t>3/2/2020</a:t>
             </a:fld>
             <a:endParaRPr lang="en-US"/>
           </a:p>
@@ -4698,7 +4698,7 @@
           <a:p>
             <a:fld id="{61FD5E12-641C-4696-BA65-B86205845F69}" type="datetimeFigureOut">
               <a:rPr lang="en-US" smtClean="0"/>
-              <a:t>2/27/2019</a:t>
+              <a:t>3/2/2020</a:t>
             </a:fld>
             <a:endParaRPr lang="en-US"/>
           </a:p>
@@ -8261,7 +8261,7 @@
               <a:buNone/>
             </a:pPr>
             <a:r>
-              <a:rPr lang="en-US" dirty="0" smtClean="0">
+              <a:rPr lang="en-US" sz="2800" dirty="0" smtClean="0">
                 <a:solidFill>
                   <a:srgbClr val="800000"/>
                 </a:solidFill>
@@ -8270,7 +8270,7 @@
               <a:t>&lt;button</a:t>
             </a:r>
             <a:r>
-              <a:rPr lang="en-US" dirty="0" smtClean="0">
+              <a:rPr lang="en-US" sz="2800" dirty="0" smtClean="0">
                 <a:solidFill>
                   <a:srgbClr val="000000"/>
                 </a:solidFill>
@@ -8279,7 +8279,7 @@
               <a:t> </a:t>
             </a:r>
             <a:r>
-              <a:rPr lang="en-US" dirty="0" err="1" smtClean="0">
+              <a:rPr lang="en-US" sz="2800" dirty="0" err="1" smtClean="0">
                 <a:solidFill>
                   <a:srgbClr val="FF0000"/>
                 </a:solidFill>
@@ -8288,7 +8288,7 @@
               <a:t>onclick</a:t>
             </a:r>
             <a:r>
-              <a:rPr lang="en-US" dirty="0" smtClean="0">
+              <a:rPr lang="en-US" sz="2800" dirty="0" smtClean="0">
                 <a:solidFill>
                   <a:srgbClr val="000000"/>
                 </a:solidFill>
@@ -8297,7 +8297,7 @@
               <a:t>=</a:t>
             </a:r>
             <a:r>
-              <a:rPr lang="en-US" dirty="0">
+              <a:rPr lang="en-US" sz="2800" dirty="0">
                 <a:solidFill>
                   <a:srgbClr val="0000FF"/>
                 </a:solidFill>
@@ -8306,7 +8306,7 @@
               <a:t>"</a:t>
             </a:r>
             <a:r>
-              <a:rPr lang="en-US" dirty="0" err="1" smtClean="0">
+              <a:rPr lang="en-US" sz="2800" dirty="0" err="1" smtClean="0">
                 <a:solidFill>
                   <a:srgbClr val="0000FF"/>
                 </a:solidFill>
@@ -8315,7 +8315,7 @@
               <a:t>buttonClick</a:t>
             </a:r>
             <a:r>
-              <a:rPr lang="en-US" dirty="0" smtClean="0">
+              <a:rPr lang="en-US" sz="2800" dirty="0" smtClean="0">
                 <a:solidFill>
                   <a:srgbClr val="0000FF"/>
                 </a:solidFill>
@@ -8324,13 +8324,40 @@
               <a:t>()"</a:t>
             </a:r>
             <a:r>
-              <a:rPr lang="en-US" dirty="0" smtClean="0">
+              <a:rPr lang="en-US" sz="2800" dirty="0" smtClean="0">
                 <a:solidFill>
                   <a:srgbClr val="800000"/>
                 </a:solidFill>
                 <a:latin typeface="Consolas" panose="020B0609020204030204" pitchFamily="49" charset="0"/>
               </a:rPr>
-              <a:t>&gt;&lt;/button&gt;</a:t>
+              <a:t>&gt;</a:t>
+            </a:r>
+            <a:r>
+              <a:rPr lang="en-US" sz="2800" dirty="0" smtClean="0">
+                <a:solidFill>
+                  <a:schemeClr val="tx1"/>
+                </a:solidFill>
+                <a:latin typeface="Consolas" panose="020B0609020204030204" pitchFamily="49" charset="0"/>
+              </a:rPr>
+              <a:t>Send</a:t>
+            </a:r>
+            <a:r>
+              <a:rPr lang="en-US" sz="2800" dirty="0" smtClean="0">
+                <a:solidFill>
+                  <a:srgbClr val="800000"/>
+                </a:solidFill>
+                <a:latin typeface="Consolas" panose="020B0609020204030204" pitchFamily="49" charset="0"/>
+              </a:rPr>
+              <a:t>&lt;/</a:t>
+            </a:r>
+            <a:r>
+              <a:rPr lang="en-US" sz="2800" dirty="0" smtClean="0">
+                <a:solidFill>
+                  <a:srgbClr val="800000"/>
+                </a:solidFill>
+                <a:latin typeface="Consolas" panose="020B0609020204030204" pitchFamily="49" charset="0"/>
+              </a:rPr>
+              <a:t>button&gt;</a:t>
             </a:r>
           </a:p>
           <a:p>

</xml_diff>